<commit_message>
Add : Unique ID Project
</commit_message>
<xml_diff>
--- a/Monitoring/fc.pptx
+++ b/Monitoring/fc.pptx
@@ -5319,7 +5319,7 @@
         <p:spPr>
           <a:xfrm>
             <a:off x="251520" y="260648"/>
-            <a:ext cx="8640960" cy="5016758"/>
+            <a:ext cx="8640960" cy="5632311"/>
           </a:xfrm>
           <a:prstGeom prst="rect">
             <a:avLst/>
@@ -5948,7 +5948,42 @@
             </a:r>
             <a:r>
               <a:rPr lang="ko-KR" altLang="en-US" sz="1000" dirty="0" smtClean="0"/>
-              <a:t>들의 상태를 파악할 수 있게 구성</a:t>
+              <a:t>들의 상태를 파악할 수 있게 </a:t>
+            </a:r>
+            <a:r>
+              <a:rPr lang="ko-KR" altLang="en-US" sz="1000" dirty="0" smtClean="0"/>
+              <a:t>구성</a:t>
+            </a:r>
+            <a:r>
+              <a:rPr lang="en-US" altLang="ko-KR" sz="1000" dirty="0" smtClean="0"/>
+              <a:t/>
+            </a:r>
+            <a:br>
+              <a:rPr lang="en-US" altLang="ko-KR" sz="1000" dirty="0" smtClean="0"/>
+            </a:br>
+            <a:r>
+              <a:rPr lang="en-US" altLang="ko-KR" sz="1000" dirty="0" smtClean="0"/>
+              <a:t> 5) </a:t>
+            </a:r>
+            <a:r>
+              <a:rPr lang="ko-KR" altLang="en-US" sz="1000" dirty="0" smtClean="0"/>
+              <a:t>제품 배포 파일 구성</a:t>
+            </a:r>
+            <a:r>
+              <a:rPr lang="en-US" altLang="ko-KR" sz="1000" dirty="0" smtClean="0"/>
+              <a:t>(EXE, MSI </a:t>
+            </a:r>
+            <a:r>
+              <a:rPr lang="ko-KR" altLang="en-US" sz="1000" dirty="0" smtClean="0"/>
+              <a:t>등의 설치파일 제작</a:t>
+            </a:r>
+            <a:r>
+              <a:rPr lang="en-US" altLang="ko-KR" sz="1000" dirty="0" smtClean="0"/>
+              <a:t>)</a:t>
+            </a:r>
+            <a:r>
+              <a:rPr lang="ko-KR" altLang="en-US" sz="1000" dirty="0" smtClean="0"/>
+              <a:t> </a:t>
             </a:r>
             <a:endParaRPr lang="en-US" altLang="ko-KR" sz="1000" dirty="0" smtClean="0"/>
           </a:p>
@@ -5966,7 +6001,27 @@
             </a:r>
             <a:r>
               <a:rPr lang="ko-KR" altLang="en-US" sz="1000" dirty="0" smtClean="0"/>
-              <a:t>불법 사용 방지</a:t>
+              <a:t>불법 사용 </a:t>
+            </a:r>
+            <a:r>
+              <a:rPr lang="ko-KR" altLang="en-US" sz="1000" dirty="0" smtClean="0"/>
+              <a:t>방지 </a:t>
+            </a:r>
+            <a:r>
+              <a:rPr lang="en-US" altLang="ko-KR" sz="1000" dirty="0" smtClean="0"/>
+              <a:t>– </a:t>
+            </a:r>
+            <a:r>
+              <a:rPr lang="ko-KR" altLang="en-US" sz="1000" dirty="0" smtClean="0"/>
+              <a:t>제품</a:t>
+            </a:r>
+            <a:r>
+              <a:rPr lang="en-US" altLang="ko-KR" sz="1000" dirty="0" smtClean="0"/>
+              <a:t> Key</a:t>
+            </a:r>
+            <a:r>
+              <a:rPr lang="ko-KR" altLang="en-US" sz="1000" dirty="0" smtClean="0"/>
+              <a:t>관리 필요</a:t>
             </a:r>
             <a:endParaRPr lang="en-US" altLang="ko-KR" sz="1000" dirty="0" smtClean="0"/>
           </a:p>
@@ -6004,14 +6059,6 @@
             </a:r>
             <a:r>
               <a:rPr lang="en-US" altLang="ko-KR" sz="1000" dirty="0" smtClean="0"/>
-              <a:t>HW Dongle</a:t>
-            </a:r>
-            <a:r>
-              <a:rPr lang="ko-KR" altLang="en-US" sz="1000" dirty="0" smtClean="0"/>
-              <a:t>을 사용하는 것이 가장 안전함</a:t>
-            </a:r>
-            <a:r>
-              <a:rPr lang="en-US" altLang="ko-KR" sz="1000" dirty="0" smtClean="0"/>
               <a:t/>
             </a:r>
             <a:br>
@@ -6019,7 +6066,96 @@
             </a:br>
             <a:r>
               <a:rPr lang="en-US" altLang="ko-KR" sz="1000" dirty="0" smtClean="0"/>
-              <a:t>     </a:t>
+              <a:t>   - HW </a:t>
+            </a:r>
+            <a:r>
+              <a:rPr lang="en-US" altLang="ko-KR" sz="1000" dirty="0" smtClean="0"/>
+              <a:t>Dongle</a:t>
+            </a:r>
+            <a:r>
+              <a:rPr lang="ko-KR" altLang="en-US" sz="1000" dirty="0" smtClean="0"/>
+              <a:t>을 사용하는 것이 가장 </a:t>
+            </a:r>
+            <a:r>
+              <a:rPr lang="ko-KR" altLang="en-US" sz="1000" dirty="0" smtClean="0"/>
+              <a:t>안전함</a:t>
+            </a:r>
+            <a:r>
+              <a:rPr lang="en-US" altLang="ko-KR" sz="1000" dirty="0" smtClean="0"/>
+              <a:t/>
+            </a:r>
+            <a:br>
+              <a:rPr lang="en-US" altLang="ko-KR" sz="1000" dirty="0" smtClean="0"/>
+            </a:br>
+            <a:r>
+              <a:rPr lang="en-US" altLang="ko-KR" sz="1000" dirty="0" smtClean="0"/>
+              <a:t>   - Dongle</a:t>
+            </a:r>
+            <a:r>
+              <a:rPr lang="ko-KR" altLang="en-US" sz="1000" dirty="0" smtClean="0"/>
+              <a:t>을 사용하지 않을 경우 </a:t>
+            </a:r>
+            <a:r>
+              <a:rPr lang="en-US" altLang="ko-KR" sz="1000" dirty="0" smtClean="0"/>
+              <a:t>HW</a:t>
+            </a:r>
+            <a:r>
+              <a:rPr lang="ko-KR" altLang="en-US" sz="1000" dirty="0" smtClean="0"/>
+              <a:t>의 유일값을 이용하여 제품등록에 이용할 수 있게 함</a:t>
+            </a:r>
+            <a:r>
+              <a:rPr lang="en-US" altLang="ko-KR" sz="1000" dirty="0" smtClean="0"/>
+              <a:t/>
+            </a:r>
+            <a:br>
+              <a:rPr lang="en-US" altLang="ko-KR" sz="1000" dirty="0" smtClean="0"/>
+            </a:br>
+            <a:r>
+              <a:rPr lang="en-US" altLang="ko-KR" sz="1000" dirty="0" smtClean="0"/>
+              <a:t>      </a:t>
+            </a:r>
+            <a:r>
+              <a:rPr lang="en-US" altLang="ko-KR" sz="1000" dirty="0" smtClean="0"/>
+              <a:t>ex) Machine </a:t>
+            </a:r>
+            <a:r>
+              <a:rPr lang="en-US" altLang="ko-KR" sz="1000" dirty="0" smtClean="0"/>
+              <a:t>GUID, MAC</a:t>
+            </a:r>
+            <a:r>
+              <a:rPr lang="ko-KR" altLang="en-US" sz="1000" dirty="0" smtClean="0"/>
+              <a:t>주소</a:t>
+            </a:r>
+            <a:r>
+              <a:rPr lang="en-US" altLang="ko-KR" sz="1000" dirty="0" smtClean="0"/>
+              <a:t>, Processor ID, Motherboard ID, </a:t>
+            </a:r>
+            <a:r>
+              <a:rPr lang="ko-KR" altLang="en-US" sz="1000" dirty="0" smtClean="0"/>
+              <a:t>하드디스크 시리얼넘버</a:t>
+            </a:r>
+            <a:r>
+              <a:rPr lang="en-US" altLang="ko-KR" sz="1000" dirty="0" smtClean="0"/>
+              <a:t> </a:t>
+            </a:r>
+            <a:r>
+              <a:rPr lang="ko-KR" altLang="en-US" sz="1000" dirty="0" smtClean="0"/>
+              <a:t>등</a:t>
+            </a:r>
+            <a:r>
+              <a:rPr lang="en-US" altLang="ko-KR" sz="1000" dirty="0" smtClean="0"/>
+              <a:t/>
+            </a:r>
+            <a:br>
+              <a:rPr lang="en-US" altLang="ko-KR" sz="1000" dirty="0" smtClean="0"/>
+            </a:br>
+            <a:r>
+              <a:rPr lang="en-US" altLang="ko-KR" sz="1000" dirty="0" smtClean="0"/>
+              <a:t>   </a:t>
+            </a:r>
+            <a:r>
+              <a:rPr lang="en-US" altLang="ko-KR" sz="1000" dirty="0" smtClean="0"/>
+              <a:t>- </a:t>
             </a:r>
             <a:r>
               <a:rPr lang="ko-KR" altLang="en-US" sz="1000" dirty="0" smtClean="0"/>
@@ -6039,7 +6175,7 @@
             </a:r>
             <a:r>
               <a:rPr lang="ko-KR" altLang="en-US" sz="1000" dirty="0" smtClean="0"/>
-              <a:t>하여 </a:t>
+              <a:t>하면 </a:t>
             </a:r>
             <a:r>
               <a:rPr lang="ko-KR" altLang="en-US" sz="1000" dirty="0" err="1" smtClean="0"/>
@@ -6047,9 +6183,135 @@
             </a:r>
             <a:r>
               <a:rPr lang="ko-KR" altLang="en-US" sz="1000" dirty="0" smtClean="0"/>
-              <a:t> 바이러스 감염 등을 확인할 수 있음</a:t>
-            </a:r>
+              <a:t> 바이러스 감염 등을 확인할 수 </a:t>
+            </a:r>
+            <a:r>
+              <a:rPr lang="ko-KR" altLang="en-US" sz="1000" dirty="0" smtClean="0"/>
+              <a:t>있음</a:t>
+            </a:r>
+            <a:r>
+              <a:rPr lang="en-US" altLang="ko-KR" sz="1000" dirty="0" smtClean="0"/>
+              <a:t/>
+            </a:r>
+            <a:br>
+              <a:rPr lang="en-US" altLang="ko-KR" sz="1000" dirty="0" smtClean="0"/>
+            </a:br>
             <a:endParaRPr lang="en-US" altLang="ko-KR" sz="1000" dirty="0" smtClean="0"/>
+          </a:p>
+        </p:txBody>
+      </p:sp>
+      <p:sp>
+        <p:nvSpPr>
+          <p:cNvPr id="6" name="TextBox 5"/>
+          <p:cNvSpPr txBox="1"/>
+          <p:nvPr/>
+        </p:nvSpPr>
+        <p:spPr>
+          <a:xfrm>
+            <a:off x="179512" y="6093296"/>
+            <a:ext cx="8640960" cy="553998"/>
+          </a:xfrm>
+          <a:prstGeom prst="rect">
+            <a:avLst/>
+          </a:prstGeom>
+          <a:noFill/>
+        </p:spPr>
+        <p:txBody>
+          <a:bodyPr wrap="square" rtlCol="0">
+            <a:spAutoFit/>
+          </a:bodyPr>
+          <a:lstStyle/>
+          <a:p>
+            <a:pPr>
+              <a:buFont typeface="Arial" charset="0"/>
+              <a:buChar char="•"/>
+            </a:pPr>
+            <a:r>
+              <a:rPr lang="en-US" altLang="ko-KR" sz="1000" dirty="0" smtClean="0"/>
+              <a:t> Machine GUID </a:t>
+            </a:r>
+            <a:r>
+              <a:rPr lang="ko-KR" altLang="en-US" sz="1000" dirty="0" smtClean="0"/>
+              <a:t>정보</a:t>
+            </a:r>
+            <a:r>
+              <a:rPr lang="en-US" altLang="ko-KR" sz="1000" dirty="0" smtClean="0"/>
+              <a:t> : HKEY_LOCAL_MACHINE\SOFTWARE\Microsoft\Cryptography </a:t>
+            </a:r>
+            <a:endParaRPr lang="en-US" altLang="ko-KR" sz="1000" dirty="0" smtClean="0"/>
+          </a:p>
+          <a:p>
+            <a:pPr>
+              <a:buFont typeface="Arial" charset="0"/>
+              <a:buChar char="•"/>
+            </a:pPr>
+            <a:r>
+              <a:rPr lang="en-US" altLang="ko-KR" sz="1000" dirty="0" smtClean="0"/>
+              <a:t> Processor ID </a:t>
+            </a:r>
+            <a:r>
+              <a:rPr lang="ko-KR" altLang="en-US" sz="1000" dirty="0" smtClean="0"/>
+              <a:t>등의 정보 </a:t>
+            </a:r>
+            <a:r>
+              <a:rPr lang="en-US" altLang="ko-KR" sz="1000" dirty="0" smtClean="0"/>
+              <a:t>: </a:t>
+            </a:r>
+            <a:r>
+              <a:rPr lang="en-US" altLang="ko-KR" sz="1000" dirty="0" err="1" smtClean="0"/>
+              <a:t>ManagementObjectSearcher</a:t>
+            </a:r>
+            <a:r>
+              <a:rPr lang="en-US" altLang="ko-KR" sz="1000" dirty="0" smtClean="0"/>
+              <a:t> Class </a:t>
+            </a:r>
+            <a:r>
+              <a:rPr lang="ko-KR" altLang="en-US" sz="1000" dirty="0" smtClean="0"/>
+              <a:t>사용 </a:t>
+            </a:r>
+            <a:r>
+              <a:rPr lang="en-US" altLang="ko-KR" sz="1000" smtClean="0"/>
+              <a:t>(Win32_Processor, Win32_baseboard, Win32_DiskDrive, … </a:t>
+            </a:r>
+            <a:r>
+              <a:rPr lang="en-US" altLang="ko-KR" sz="1000" dirty="0" smtClean="0"/>
+              <a:t>)</a:t>
+            </a:r>
+          </a:p>
+          <a:p>
+            <a:pPr>
+              <a:buFont typeface="Arial" charset="0"/>
+              <a:buChar char="•"/>
+            </a:pPr>
+            <a:r>
+              <a:rPr lang="en-US" altLang="ko-KR" sz="1000" dirty="0" smtClean="0"/>
+              <a:t> </a:t>
+            </a:r>
+            <a:r>
+              <a:rPr lang="en-US" altLang="ko-KR" sz="1000" dirty="0" smtClean="0"/>
+              <a:t>MAC </a:t>
+            </a:r>
+            <a:r>
+              <a:rPr lang="ko-KR" altLang="en-US" sz="1000" dirty="0" smtClean="0"/>
+              <a:t>주소 </a:t>
+            </a:r>
+            <a:r>
+              <a:rPr lang="en-US" altLang="ko-KR" sz="1000" dirty="0" smtClean="0"/>
+              <a:t>: </a:t>
+            </a:r>
+            <a:r>
+              <a:rPr lang="en-US" altLang="ko-KR" sz="1000" dirty="0" err="1" smtClean="0"/>
+              <a:t>NetworkInterface</a:t>
+            </a:r>
+            <a:r>
+              <a:rPr lang="en-US" altLang="ko-KR" sz="1000" dirty="0" smtClean="0"/>
+              <a:t> Class </a:t>
+            </a:r>
+            <a:r>
+              <a:rPr lang="ko-KR" altLang="en-US" sz="1000" dirty="0" smtClean="0"/>
+              <a:t>사용</a:t>
+            </a:r>
+            <a:endParaRPr lang="ko-KR" altLang="en-US" sz="1000" dirty="0"/>
           </a:p>
         </p:txBody>
       </p:sp>

</xml_diff>